<commit_message>
XPDays: Vortragsfolien (PPTX & PDF)
</commit_message>
<xml_diff>
--- a/JUnit HierarchicalContextRunner.pptx
+++ b/JUnit HierarchicalContextRunner.pptx
@@ -271,7 +271,7 @@
               <a:pPr>
                 <a:defRPr/>
               </a:pPr>
-              <a:t>13.10.14</a:t>
+              <a:t>14.10.14</a:t>
             </a:fld>
             <a:endParaRPr lang="de-CH"/>
           </a:p>
@@ -632,7 +632,7 @@
               <a:pPr>
                 <a:defRPr/>
               </a:pPr>
-              <a:t>13.10.14</a:t>
+              <a:t>14.10.14</a:t>
             </a:fld>
             <a:endParaRPr lang="de-CH"/>
           </a:p>
@@ -4630,7 +4630,7 @@
               <a:pPr>
                 <a:defRPr/>
               </a:pPr>
-              <a:t>13.10.14</a:t>
+              <a:t>14.10.14</a:t>
             </a:fld>
             <a:endParaRPr lang="de-DE"/>
           </a:p>
@@ -13605,11 +13605,7 @@
             <a:pPr lvl="1"/>
             <a:r>
               <a:rPr lang="de-DE" dirty="0" smtClean="0"/>
-              <a:t>Keine statischen Klassen innerhalb eines </a:t>
-            </a:r>
-            <a:r>
-              <a:rPr lang="de-DE" dirty="0" smtClean="0"/>
-              <a:t>Kontexts</a:t>
+              <a:t>Keine statischen Klassen innerhalb eines Kontexts</a:t>
             </a:r>
           </a:p>
           <a:p>
@@ -13623,19 +13619,7 @@
             <a:pPr lvl="1"/>
             <a:r>
               <a:rPr lang="de-DE" dirty="0" smtClean="0"/>
-              <a:t>Ausführung </a:t>
-            </a:r>
-            <a:r>
-              <a:rPr lang="de-DE" dirty="0" smtClean="0"/>
-              <a:t>einzelner Test-Methoden </a:t>
-            </a:r>
-            <a:r>
-              <a:rPr lang="de-DE" dirty="0" smtClean="0"/>
-              <a:t>(noch) nicht </a:t>
-            </a:r>
-            <a:r>
-              <a:rPr lang="de-DE" dirty="0" smtClean="0"/>
-              <a:t>möglich</a:t>
+              <a:t>Ausführung einzelner Test-Methoden (noch) nicht möglich</a:t>
             </a:r>
           </a:p>
           <a:p>
@@ -13687,11 +13671,7 @@
             </a:r>
             <a:r>
               <a:rPr lang="de-DE" dirty="0" smtClean="0"/>
-              <a:t>Runner </a:t>
-            </a:r>
-            <a:r>
-              <a:rPr lang="de-DE" dirty="0" smtClean="0"/>
-              <a:t>zusammen</a:t>
+              <a:t>Runner zusammen</a:t>
             </a:r>
           </a:p>
           <a:p>
@@ -13700,7 +13680,6 @@
               <a:rPr lang="de-DE" dirty="0" smtClean="0"/>
               <a:t>Beschreibung im Ergebnis (noch) nicht optimal</a:t>
             </a:r>
-            <a:endParaRPr lang="de-DE" dirty="0" smtClean="0"/>
           </a:p>
         </p:txBody>
       </p:sp>
@@ -13944,7 +13923,50 @@
           <a:bodyPr/>
           <a:lstStyle/>
           <a:p>
-            <a:endParaRPr lang="de-DE"/>
+            <a:r>
+              <a:rPr lang="de-DE" dirty="0" smtClean="0"/>
+              <a:t>Alle Beispiele und die Präsentation sind zu finden unter:</a:t>
+            </a:r>
+            <a:br>
+              <a:rPr lang="de-DE" dirty="0" smtClean="0"/>
+            </a:br>
+            <a:r>
+              <a:rPr lang="nl-NL" dirty="0" err="1">
+                <a:latin typeface="Arial" charset="0"/>
+              </a:rPr>
+              <a:t>https</a:t>
+            </a:r>
+            <a:r>
+              <a:rPr lang="nl-NL" dirty="0">
+                <a:latin typeface="Arial" charset="0"/>
+              </a:rPr>
+              <a:t>://</a:t>
+            </a:r>
+            <a:r>
+              <a:rPr lang="nl-NL" dirty="0" err="1">
+                <a:latin typeface="Arial" charset="0"/>
+              </a:rPr>
+              <a:t>github.com</a:t>
+            </a:r>
+            <a:r>
+              <a:rPr lang="nl-NL" dirty="0">
+                <a:latin typeface="Arial" charset="0"/>
+              </a:rPr>
+              <a:t>/</a:t>
+            </a:r>
+            <a:r>
+              <a:rPr lang="nl-NL" dirty="0" err="1">
+                <a:latin typeface="Arial" charset="0"/>
+              </a:rPr>
+              <a:t>bechte</a:t>
+            </a:r>
+            <a:r>
+              <a:rPr lang="nl-NL" dirty="0">
+                <a:latin typeface="Arial" charset="0"/>
+              </a:rPr>
+              <a:t>/XPDays2014</a:t>
+            </a:r>
+            <a:endParaRPr lang="de-DE" dirty="0"/>
           </a:p>
         </p:txBody>
       </p:sp>
@@ -15281,9 +15303,6 @@
               </a:rPr>
               <a:t>Funktionsweise</a:t>
             </a:r>
-            <a:endParaRPr lang="de-DE" dirty="0" smtClean="0">
-              <a:latin typeface="Arial" charset="0"/>
-            </a:endParaRPr>
           </a:p>
           <a:p>
             <a:pPr lvl="1"/>

</xml_diff>